<commit_message>
updated slides - Mars version of Eclipse, OSGi console
</commit_message>
<xml_diff>
--- a/slides/01-osgi/01-osgi.pptx
+++ b/slides/01-osgi/01-osgi.pptx
@@ -149,6 +149,36 @@
       </a:defRPr>
     </a:lvl9pPr>
   </p:defaultTextStyle>
+  <p:extLst>
+    <p:ext uri="{EFAFB233-063F-42B5-8137-9DF3F51BA10A}">
+      <p15:sldGuideLst xmlns:p15="http://schemas.microsoft.com/office/powerpoint/2012/main">
+        <p15:guide id="1" orient="horz" pos="2160">
+          <p15:clr>
+            <a:srgbClr val="A4A3A4"/>
+          </p15:clr>
+        </p15:guide>
+        <p15:guide id="2" pos="2880">
+          <p15:clr>
+            <a:srgbClr val="A4A3A4"/>
+          </p15:clr>
+        </p15:guide>
+      </p15:sldGuideLst>
+    </p:ext>
+    <p:ext uri="{2D200454-40CA-4A62-9FC3-DE9A4176ACB9}">
+      <p15:notesGuideLst xmlns:p15="http://schemas.microsoft.com/office/powerpoint/2012/main">
+        <p15:guide id="1" orient="horz" pos="2880">
+          <p15:clr>
+            <a:srgbClr val="A4A3A4"/>
+          </p15:clr>
+        </p15:guide>
+        <p15:guide id="2" pos="2160">
+          <p15:clr>
+            <a:srgbClr val="A4A3A4"/>
+          </p15:clr>
+        </p15:guide>
+      </p15:notesGuideLst>
+    </p:ext>
+  </p:extLst>
 </p:presentation>
 </file>
 
@@ -235,7 +265,7 @@
             <a:fld id="{44F2E173-AC20-46B7-B073-0E359536B958}" type="datetimeFigureOut">
               <a:rPr lang="cs-CZ" smtClean="0"/>
               <a:pPr/>
-              <a:t>20.2.2014</a:t>
+              <a:t>1. 3. 2016</a:t>
             </a:fld>
             <a:endParaRPr lang="cs-CZ"/>
           </a:p>
@@ -550,7 +580,7 @@
           <a:bodyPr/>
           <a:lstStyle/>
           <a:p>
-            <a:endParaRPr lang="cs-CZ"/>
+            <a:endParaRPr lang="en-US"/>
           </a:p>
         </p:txBody>
       </p:sp>
@@ -572,6 +602,176 @@
             <a:fld id="{8550B902-BA19-4608-8988-785C58AFAC47}" type="slidenum">
               <a:rPr lang="cs-CZ" smtClean="0"/>
               <a:pPr/>
+              <a:t>3</a:t>
+            </a:fld>
+            <a:endParaRPr lang="cs-CZ"/>
+          </a:p>
+        </p:txBody>
+      </p:sp>
+    </p:spTree>
+    <p:extLst>
+      <p:ext uri="{BB962C8B-B14F-4D97-AF65-F5344CB8AC3E}">
+        <p14:creationId xmlns:p14="http://schemas.microsoft.com/office/powerpoint/2010/main" val="2669804574"/>
+      </p:ext>
+    </p:extLst>
+  </p:cSld>
+  <p:clrMapOvr>
+    <a:masterClrMapping/>
+  </p:clrMapOvr>
+</p:notes>
+</file>
+
+<file path=ppt/notesSlides/notesSlide2.xml><?xml version="1.0" encoding="utf-8"?>
+<p:notes xmlns:a="http://schemas.openxmlformats.org/drawingml/2006/main" xmlns:r="http://schemas.openxmlformats.org/officeDocument/2006/relationships" xmlns:p="http://schemas.openxmlformats.org/presentationml/2006/main">
+  <p:cSld>
+    <p:spTree>
+      <p:nvGrpSpPr>
+        <p:cNvPr id="1" name=""/>
+        <p:cNvGrpSpPr/>
+        <p:nvPr/>
+      </p:nvGrpSpPr>
+      <p:grpSpPr>
+        <a:xfrm>
+          <a:off x="0" y="0"/>
+          <a:ext cx="0" cy="0"/>
+          <a:chOff x="0" y="0"/>
+          <a:chExt cx="0" cy="0"/>
+        </a:xfrm>
+      </p:grpSpPr>
+      <p:sp>
+        <p:nvSpPr>
+          <p:cNvPr id="2" name="Slide Image Placeholder 1"/>
+          <p:cNvSpPr>
+            <a:spLocks noGrp="1" noRot="1" noChangeAspect="1"/>
+          </p:cNvSpPr>
+          <p:nvPr>
+            <p:ph type="sldImg"/>
+          </p:nvPr>
+        </p:nvSpPr>
+        <p:spPr/>
+      </p:sp>
+      <p:sp>
+        <p:nvSpPr>
+          <p:cNvPr id="3" name="Notes Placeholder 2"/>
+          <p:cNvSpPr>
+            <a:spLocks noGrp="1"/>
+          </p:cNvSpPr>
+          <p:nvPr>
+            <p:ph type="body" idx="1"/>
+          </p:nvPr>
+        </p:nvSpPr>
+        <p:spPr/>
+        <p:txBody>
+          <a:bodyPr/>
+          <a:lstStyle/>
+          <a:p>
+            <a:endParaRPr lang="en-US"/>
+          </a:p>
+        </p:txBody>
+      </p:sp>
+      <p:sp>
+        <p:nvSpPr>
+          <p:cNvPr id="4" name="Slide Number Placeholder 3"/>
+          <p:cNvSpPr>
+            <a:spLocks noGrp="1"/>
+          </p:cNvSpPr>
+          <p:nvPr>
+            <p:ph type="sldNum" sz="quarter" idx="10"/>
+          </p:nvPr>
+        </p:nvSpPr>
+        <p:spPr/>
+        <p:txBody>
+          <a:bodyPr/>
+          <a:lstStyle/>
+          <a:p>
+            <a:fld id="{8550B902-BA19-4608-8988-785C58AFAC47}" type="slidenum">
+              <a:rPr lang="cs-CZ" smtClean="0"/>
+              <a:pPr/>
+              <a:t>4</a:t>
+            </a:fld>
+            <a:endParaRPr lang="cs-CZ"/>
+          </a:p>
+        </p:txBody>
+      </p:sp>
+    </p:spTree>
+    <p:extLst>
+      <p:ext uri="{BB962C8B-B14F-4D97-AF65-F5344CB8AC3E}">
+        <p14:creationId xmlns:p14="http://schemas.microsoft.com/office/powerpoint/2010/main" val="1673615979"/>
+      </p:ext>
+    </p:extLst>
+  </p:cSld>
+  <p:clrMapOvr>
+    <a:masterClrMapping/>
+  </p:clrMapOvr>
+</p:notes>
+</file>
+
+<file path=ppt/notesSlides/notesSlide3.xml><?xml version="1.0" encoding="utf-8"?>
+<p:notes xmlns:a="http://schemas.openxmlformats.org/drawingml/2006/main" xmlns:r="http://schemas.openxmlformats.org/officeDocument/2006/relationships" xmlns:p="http://schemas.openxmlformats.org/presentationml/2006/main">
+  <p:cSld>
+    <p:spTree>
+      <p:nvGrpSpPr>
+        <p:cNvPr id="1" name=""/>
+        <p:cNvGrpSpPr/>
+        <p:nvPr/>
+      </p:nvGrpSpPr>
+      <p:grpSpPr>
+        <a:xfrm>
+          <a:off x="0" y="0"/>
+          <a:ext cx="0" cy="0"/>
+          <a:chOff x="0" y="0"/>
+          <a:chExt cx="0" cy="0"/>
+        </a:xfrm>
+      </p:grpSpPr>
+      <p:sp>
+        <p:nvSpPr>
+          <p:cNvPr id="2" name="Slide Image Placeholder 1"/>
+          <p:cNvSpPr>
+            <a:spLocks noGrp="1" noRot="1" noChangeAspect="1"/>
+          </p:cNvSpPr>
+          <p:nvPr>
+            <p:ph type="sldImg"/>
+          </p:nvPr>
+        </p:nvSpPr>
+        <p:spPr/>
+      </p:sp>
+      <p:sp>
+        <p:nvSpPr>
+          <p:cNvPr id="3" name="Notes Placeholder 2"/>
+          <p:cNvSpPr>
+            <a:spLocks noGrp="1"/>
+          </p:cNvSpPr>
+          <p:nvPr>
+            <p:ph type="body" idx="1"/>
+          </p:nvPr>
+        </p:nvSpPr>
+        <p:spPr/>
+        <p:txBody>
+          <a:bodyPr/>
+          <a:lstStyle/>
+          <a:p>
+            <a:endParaRPr lang="cs-CZ"/>
+          </a:p>
+        </p:txBody>
+      </p:sp>
+      <p:sp>
+        <p:nvSpPr>
+          <p:cNvPr id="4" name="Slide Number Placeholder 3"/>
+          <p:cNvSpPr>
+            <a:spLocks noGrp="1"/>
+          </p:cNvSpPr>
+          <p:nvPr>
+            <p:ph type="sldNum" sz="quarter" idx="10"/>
+          </p:nvPr>
+        </p:nvSpPr>
+        <p:spPr/>
+        <p:txBody>
+          <a:bodyPr/>
+          <a:lstStyle/>
+          <a:p>
+            <a:fld id="{8550B902-BA19-4608-8988-785C58AFAC47}" type="slidenum">
+              <a:rPr lang="cs-CZ" smtClean="0"/>
+              <a:pPr/>
               <a:t>15</a:t>
             </a:fld>
             <a:endParaRPr lang="cs-CZ"/>
@@ -582,6 +782,91 @@
     <p:extLst>
       <p:ext uri="{BB962C8B-B14F-4D97-AF65-F5344CB8AC3E}">
         <p14:creationId xmlns:p14="http://schemas.microsoft.com/office/powerpoint/2010/main" val="125060433"/>
+      </p:ext>
+    </p:extLst>
+  </p:cSld>
+  <p:clrMapOvr>
+    <a:masterClrMapping/>
+  </p:clrMapOvr>
+</p:notes>
+</file>
+
+<file path=ppt/notesSlides/notesSlide4.xml><?xml version="1.0" encoding="utf-8"?>
+<p:notes xmlns:a="http://schemas.openxmlformats.org/drawingml/2006/main" xmlns:r="http://schemas.openxmlformats.org/officeDocument/2006/relationships" xmlns:p="http://schemas.openxmlformats.org/presentationml/2006/main">
+  <p:cSld>
+    <p:spTree>
+      <p:nvGrpSpPr>
+        <p:cNvPr id="1" name=""/>
+        <p:cNvGrpSpPr/>
+        <p:nvPr/>
+      </p:nvGrpSpPr>
+      <p:grpSpPr>
+        <a:xfrm>
+          <a:off x="0" y="0"/>
+          <a:ext cx="0" cy="0"/>
+          <a:chOff x="0" y="0"/>
+          <a:chExt cx="0" cy="0"/>
+        </a:xfrm>
+      </p:grpSpPr>
+      <p:sp>
+        <p:nvSpPr>
+          <p:cNvPr id="2" name="Slide Image Placeholder 1"/>
+          <p:cNvSpPr>
+            <a:spLocks noGrp="1" noRot="1" noChangeAspect="1"/>
+          </p:cNvSpPr>
+          <p:nvPr>
+            <p:ph type="sldImg"/>
+          </p:nvPr>
+        </p:nvSpPr>
+        <p:spPr/>
+      </p:sp>
+      <p:sp>
+        <p:nvSpPr>
+          <p:cNvPr id="3" name="Notes Placeholder 2"/>
+          <p:cNvSpPr>
+            <a:spLocks noGrp="1"/>
+          </p:cNvSpPr>
+          <p:nvPr>
+            <p:ph type="body" idx="1"/>
+          </p:nvPr>
+        </p:nvSpPr>
+        <p:spPr/>
+        <p:txBody>
+          <a:bodyPr/>
+          <a:lstStyle/>
+          <a:p>
+            <a:endParaRPr lang="en-US"/>
+          </a:p>
+        </p:txBody>
+      </p:sp>
+      <p:sp>
+        <p:nvSpPr>
+          <p:cNvPr id="4" name="Slide Number Placeholder 3"/>
+          <p:cNvSpPr>
+            <a:spLocks noGrp="1"/>
+          </p:cNvSpPr>
+          <p:nvPr>
+            <p:ph type="sldNum" sz="quarter" idx="10"/>
+          </p:nvPr>
+        </p:nvSpPr>
+        <p:spPr/>
+        <p:txBody>
+          <a:bodyPr/>
+          <a:lstStyle/>
+          <a:p>
+            <a:fld id="{8550B902-BA19-4608-8988-785C58AFAC47}" type="slidenum">
+              <a:rPr lang="cs-CZ" smtClean="0"/>
+              <a:pPr/>
+              <a:t>43</a:t>
+            </a:fld>
+            <a:endParaRPr lang="cs-CZ"/>
+          </a:p>
+        </p:txBody>
+      </p:sp>
+    </p:spTree>
+    <p:extLst>
+      <p:ext uri="{BB962C8B-B14F-4D97-AF65-F5344CB8AC3E}">
+        <p14:creationId xmlns:p14="http://schemas.microsoft.com/office/powerpoint/2010/main" val="3785839150"/>
       </p:ext>
     </p:extLst>
   </p:cSld>
@@ -1385,15 +1670,7 @@
             </a:pPr>
             <a:r>
               <a:rPr lang="en-US" b="1" smtClean="0"/>
-              <a:t>Michal Malohlava &amp; Pavel </a:t>
-            </a:r>
-            <a:r>
-              <a:rPr lang="cs-CZ" b="1" smtClean="0"/>
-              <a:t>Parízek</a:t>
-            </a:r>
-            <a:r>
-              <a:rPr lang="en-US" b="1" smtClean="0"/>
-              <a:t>, NPRG044, OSGi framework</a:t>
+              <a:t>Michal Malohlava &amp; Pavel Parízek &amp; Jiří Vinárek, NPRG044, OSGi framework</a:t>
             </a:r>
             <a:endParaRPr lang="cs-CZ" i="1" dirty="0"/>
           </a:p>
@@ -1763,15 +2040,7 @@
             </a:pPr>
             <a:r>
               <a:rPr lang="en-US" b="1" smtClean="0"/>
-              <a:t>Michal Malohlava &amp; </a:t>
-            </a:r>
-            <a:r>
-              <a:rPr lang="cs-CZ" b="1" smtClean="0"/>
-              <a:t>Pavel Parízek</a:t>
-            </a:r>
-            <a:r>
-              <a:rPr lang="en-US" b="1" smtClean="0"/>
-              <a:t>, NPRG044, OSGi framework</a:t>
+              <a:t>Michal Malohlava &amp; Pavel Parízek &amp; Jiří Vinárek, NPRG044, OSGi framework</a:t>
             </a:r>
             <a:endParaRPr lang="cs-CZ" i="1" dirty="0"/>
           </a:p>
@@ -2061,15 +2330,7 @@
             </a:pPr>
             <a:r>
               <a:rPr lang="en-US" b="1" smtClean="0"/>
-              <a:t>Michal Malohlava &amp; Pavel </a:t>
-            </a:r>
-            <a:r>
-              <a:rPr lang="cs-CZ" b="1" smtClean="0"/>
-              <a:t>Parízek</a:t>
-            </a:r>
-            <a:r>
-              <a:rPr lang="en-US" b="1" smtClean="0"/>
-              <a:t>, NPRG044, OSGi framework</a:t>
+              <a:t>Michal Malohlava &amp; Pavel Parízek &amp; Jiří Vinárek, NPRG044, OSGi framework</a:t>
             </a:r>
             <a:endParaRPr lang="cs-CZ" i="1" dirty="0"/>
           </a:p>
@@ -2446,15 +2707,7 @@
           <a:p>
             <a:r>
               <a:rPr lang="en-US" smtClean="0"/>
-              <a:t>Michal Malohlava &amp; </a:t>
-            </a:r>
-            <a:r>
-              <a:rPr lang="cs-CZ" smtClean="0"/>
-              <a:t>Pavel Parízek</a:t>
-            </a:r>
-            <a:r>
-              <a:rPr lang="en-US" smtClean="0"/>
-              <a:t>, NPRG044, OSGi framework</a:t>
+              <a:t>Michal Malohlava &amp; Pavel Parízek &amp; Jiří Vinárek, NPRG044, OSGi framework</a:t>
             </a:r>
             <a:endParaRPr lang="cs-CZ" dirty="0"/>
           </a:p>
@@ -2859,20 +3112,32 @@
             </a:r>
             <a:r>
               <a:rPr lang="en-US" sz="2400" dirty="0" smtClean="0"/>
-              <a:t> &amp; </a:t>
-            </a:r>
-            <a:r>
-              <a:rPr lang="en-US" sz="2400" dirty="0" err="1" smtClean="0"/>
-              <a:t>Pavel</a:t>
-            </a:r>
+              <a:t> &amp; Pavel </a:t>
+            </a:r>
+            <a:r>
+              <a:rPr lang="cs-CZ" sz="2400" dirty="0" err="1" smtClean="0"/>
+              <a:t>Parízek</a:t>
+            </a:r>
+            <a:endParaRPr lang="en-US" sz="2400" dirty="0" smtClean="0"/>
+          </a:p>
+          <a:p>
             <a:r>
               <a:rPr lang="en-US" sz="2400" dirty="0" smtClean="0"/>
+              <a:t>&amp; </a:t>
+            </a:r>
+            <a:r>
+              <a:rPr lang="en-US" sz="2400" dirty="0" err="1"/>
+              <a:t>Jiří</a:t>
+            </a:r>
+            <a:r>
+              <a:rPr lang="en-US" sz="2400" dirty="0"/>
               <a:t> </a:t>
             </a:r>
             <a:r>
-              <a:rPr lang="cs-CZ" sz="2400" dirty="0" smtClean="0"/>
-              <a:t>Parízek</a:t>
-            </a:r>
+              <a:rPr lang="en-US" sz="2400" dirty="0" err="1"/>
+              <a:t>Vinárek</a:t>
+            </a:r>
+            <a:endParaRPr lang="cs-CZ" sz="2400" dirty="0" smtClean="0"/>
           </a:p>
           <a:p>
             <a:r>
@@ -2886,7 +3151,7 @@
                 <a:latin typeface="Consolas" pitchFamily="49" charset="0"/>
                 <a:cs typeface="Consolas" pitchFamily="49" charset="0"/>
               </a:rPr>
-              <a:t>parizek</a:t>
+              <a:t>vinarek</a:t>
             </a:r>
             <a:r>
               <a:rPr lang="cs-CZ" sz="1800" dirty="0" smtClean="0">
@@ -2996,7 +3261,7 @@
             </a:pPr>
             <a:r>
               <a:rPr lang="en-US" b="1" smtClean="0"/>
-              <a:t>Michal Malohlava &amp; Pavel Parízek, NPRG044, OSGi framework</a:t>
+              <a:t>Michal Malohlava &amp; Pavel Parízek &amp; Jiří Vinárek, NPRG044, OSGi framework</a:t>
             </a:r>
             <a:endParaRPr lang="cs-CZ" i="1" dirty="0"/>
           </a:p>
@@ -3180,7 +3445,7 @@
             </a:pPr>
             <a:r>
               <a:rPr lang="en-US" b="1" smtClean="0"/>
-              <a:t>Michal Malohlava &amp; Pavel Parízek, NPRG044, OSGi framework</a:t>
+              <a:t>Michal Malohlava &amp; Pavel Parízek &amp; Jiří Vinárek, NPRG044, OSGi framework</a:t>
             </a:r>
             <a:endParaRPr lang="cs-CZ" i="1" dirty="0"/>
           </a:p>
@@ -3444,7 +3709,7 @@
             </a:pPr>
             <a:r>
               <a:rPr lang="en-US" b="1" smtClean="0"/>
-              <a:t>Michal Malohlava &amp; Pavel Parízek, NPRG044, OSGi framework</a:t>
+              <a:t>Michal Malohlava &amp; Pavel Parízek &amp; Jiří Vinárek, NPRG044, OSGi framework</a:t>
             </a:r>
             <a:endParaRPr lang="cs-CZ" i="1" dirty="0"/>
           </a:p>
@@ -4216,7 +4481,7 @@
             </a:pPr>
             <a:r>
               <a:rPr lang="en-US" b="1" smtClean="0"/>
-              <a:t>Michal Malohlava &amp; Pavel Parízek, NPRG044, OSGi framework</a:t>
+              <a:t>Michal Malohlava &amp; Pavel Parízek &amp; Jiří Vinárek, NPRG044, OSGi framework</a:t>
             </a:r>
             <a:endParaRPr lang="cs-CZ" i="1" dirty="0"/>
           </a:p>
@@ -4853,7 +5118,7 @@
             </a:pPr>
             <a:r>
               <a:rPr lang="en-US" b="1" smtClean="0"/>
-              <a:t>Michal Malohlava &amp; Pavel Parízek, NPRG044, OSGi framework</a:t>
+              <a:t>Michal Malohlava &amp; Pavel Parízek &amp; Jiří Vinárek, NPRG044, OSGi framework</a:t>
             </a:r>
             <a:endParaRPr lang="cs-CZ" i="1" dirty="0"/>
           </a:p>
@@ -5193,7 +5458,7 @@
             </a:pPr>
             <a:r>
               <a:rPr lang="en-US" b="1" smtClean="0"/>
-              <a:t>Michal Malohlava &amp; Pavel Parízek, NPRG044, OSGi framework</a:t>
+              <a:t>Michal Malohlava &amp; Pavel Parízek &amp; Jiří Vinárek, NPRG044, OSGi framework</a:t>
             </a:r>
             <a:endParaRPr lang="cs-CZ" i="1" dirty="0"/>
           </a:p>
@@ -5420,7 +5685,7 @@
             </a:pPr>
             <a:r>
               <a:rPr lang="en-US" b="1" smtClean="0"/>
-              <a:t>Michal Malohlava &amp; Pavel Parízek, NPRG044, OSGi framework</a:t>
+              <a:t>Michal Malohlava &amp; Pavel Parízek &amp; Jiří Vinárek, NPRG044, OSGi framework</a:t>
             </a:r>
             <a:endParaRPr lang="cs-CZ" i="1" dirty="0"/>
           </a:p>
@@ -6561,7 +6826,7 @@
             </a:pPr>
             <a:r>
               <a:rPr lang="en-US" b="1" smtClean="0"/>
-              <a:t>Michal Malohlava &amp; Pavel Parízek, NPRG044, OSGi framework</a:t>
+              <a:t>Michal Malohlava &amp; Pavel Parízek &amp; Jiří Vinárek, NPRG044, OSGi framework</a:t>
             </a:r>
             <a:endParaRPr lang="cs-CZ" i="1" dirty="0"/>
           </a:p>
@@ -6850,7 +7115,7 @@
             </a:pPr>
             <a:r>
               <a:rPr lang="en-US" b="1" smtClean="0"/>
-              <a:t>Michal Malohlava &amp; Pavel Parízek, NPRG044, OSGi framework</a:t>
+              <a:t>Michal Malohlava &amp; Pavel Parízek &amp; Jiří Vinárek, NPRG044, OSGi framework</a:t>
             </a:r>
             <a:endParaRPr lang="cs-CZ" i="1" dirty="0"/>
           </a:p>
@@ -7169,7 +7434,7 @@
             </a:pPr>
             <a:r>
               <a:rPr lang="en-US" b="1" smtClean="0"/>
-              <a:t>Michal Malohlava &amp; Pavel Parízek, NPRG044, OSGi framework</a:t>
+              <a:t>Michal Malohlava &amp; Pavel Parízek &amp; Jiří Vinárek, NPRG044, OSGi framework</a:t>
             </a:r>
             <a:endParaRPr lang="cs-CZ" i="1" dirty="0"/>
           </a:p>
@@ -7377,26 +7642,18 @@
                   <a:srgbClr val="0070C0"/>
                 </a:solidFill>
               </a:rPr>
-              <a:t>Download Eclipse </a:t>
-            </a:r>
+              <a:t>Download Eclipse 4.5 (Mars) RCP</a:t>
+            </a:r>
+          </a:p>
+          <a:p>
             <a:r>
               <a:rPr lang="en-US" sz="4400" b="1" dirty="0" smtClean="0">
                 <a:solidFill>
                   <a:srgbClr val="0070C0"/>
                 </a:solidFill>
-              </a:rPr>
-              <a:t>4.2 (Juno) RCP</a:t>
-            </a:r>
-          </a:p>
-          <a:p>
-            <a:r>
-              <a:rPr lang="en-US" sz="4400" b="1" dirty="0" smtClean="0">
-                <a:solidFill>
-                  <a:srgbClr val="0070C0"/>
-                </a:solidFill>
                 <a:hlinkClick r:id="rId2"/>
               </a:rPr>
-              <a:t>http://www.eclipse.org/downloads/packages/release/juno/sr2/</a:t>
+              <a:t>http://www.eclipse.org/downloads/packages/release/Mars/2</a:t>
             </a:r>
             <a:endParaRPr lang="en-US" sz="4400" b="1" dirty="0">
               <a:solidFill>
@@ -7488,7 +7745,7 @@
             </a:pPr>
             <a:r>
               <a:rPr lang="en-US" b="1" smtClean="0"/>
-              <a:t>Michal Malohlava &amp; Pavel Parízek, NPRG044, OSGi framework</a:t>
+              <a:t>Michal Malohlava &amp; Pavel Parízek &amp; Jiří Vinárek, NPRG044, OSGi framework</a:t>
             </a:r>
             <a:endParaRPr lang="cs-CZ" i="1" dirty="0"/>
           </a:p>
@@ -7751,7 +8008,7 @@
             </a:pPr>
             <a:r>
               <a:rPr lang="en-US" b="1" smtClean="0"/>
-              <a:t>Michal Malohlava &amp; Pavel Parízek, NPRG044, OSGi framework</a:t>
+              <a:t>Michal Malohlava &amp; Pavel Parízek &amp; Jiří Vinárek, NPRG044, OSGi framework</a:t>
             </a:r>
             <a:endParaRPr lang="cs-CZ" i="1" dirty="0"/>
           </a:p>
@@ -7794,19 +8051,22 @@
         <p:spPr/>
         <p:txBody>
           <a:bodyPr>
-            <a:normAutofit fontScale="92500" lnSpcReduction="20000"/>
+            <a:normAutofit fontScale="62500" lnSpcReduction="20000"/>
           </a:bodyPr>
           <a:lstStyle/>
           <a:p>
             <a:r>
               <a:rPr lang="en-US" dirty="0" smtClean="0"/>
-              <a:t>Download Eclipse 4.2 </a:t>
-            </a:r>
-            <a:r>
-              <a:rPr lang="en-US" dirty="0" smtClean="0"/>
-              <a:t>(Juno) RCP</a:t>
-            </a:r>
-            <a:endParaRPr lang="en-US" dirty="0" smtClean="0"/>
+              <a:t>Download Eclipse </a:t>
+            </a:r>
+            <a:r>
+              <a:rPr lang="en-US" dirty="0" smtClean="0"/>
+              <a:t>4.5 (Mars) </a:t>
+            </a:r>
+            <a:r>
+              <a:rPr lang="en-US" dirty="0" smtClean="0"/>
+              <a:t>RCP</a:t>
+            </a:r>
           </a:p>
           <a:p>
             <a:pPr lvl="1"/>
@@ -7814,13 +8074,7 @@
               <a:rPr lang="en-US" sz="2400" dirty="0" smtClean="0">
                 <a:hlinkClick r:id="rId2"/>
               </a:rPr>
-              <a:t>http://</a:t>
-            </a:r>
-            <a:r>
-              <a:rPr lang="en-US" sz="2400" dirty="0" smtClean="0">
-                <a:hlinkClick r:id="rId2"/>
-              </a:rPr>
-              <a:t>www.eclipse.org/downloads/packages/release/juno/sr2/</a:t>
+              <a:t>http://www.eclipse.org/downloads/packages/release/Mars/2</a:t>
             </a:r>
             <a:endParaRPr lang="en-US" sz="2400" dirty="0" smtClean="0"/>
           </a:p>
@@ -7842,8 +8096,28 @@
             </a:r>
             <a:r>
               <a:rPr lang="en-US" i="1" dirty="0" smtClean="0"/>
-              <a:t>“New &gt; Project &gt; …”</a:t>
-            </a:r>
+              <a:t>“New &gt; Project &gt; </a:t>
+            </a:r>
+            <a:r>
+              <a:rPr lang="en-US" i="1" dirty="0" smtClean="0"/>
+              <a:t>Plug-in Project”</a:t>
+            </a:r>
+          </a:p>
+          <a:p>
+            <a:pPr lvl="2"/>
+            <a:r>
+              <a:rPr lang="en-US" i="1" dirty="0" smtClean="0"/>
+              <a:t>Select “an </a:t>
+            </a:r>
+            <a:r>
+              <a:rPr lang="en-US" i="1" dirty="0" err="1" smtClean="0"/>
+              <a:t>OSGi</a:t>
+            </a:r>
+            <a:r>
+              <a:rPr lang="en-US" i="1" dirty="0" smtClean="0"/>
+              <a:t> framework” and “Equinox” as Target Platform</a:t>
+            </a:r>
+            <a:endParaRPr lang="en-US" i="1" dirty="0" smtClean="0"/>
           </a:p>
           <a:p>
             <a:endParaRPr lang="en-US" dirty="0" smtClean="0"/>
@@ -7866,43 +8140,118 @@
             </a:r>
             <a:r>
               <a:rPr lang="en-US" dirty="0" smtClean="0"/>
-              <a:t> launch configuration &amp; launch it</a:t>
+              <a:t> launch configuration &amp; launch </a:t>
+            </a:r>
+            <a:r>
+              <a:rPr lang="en-US" dirty="0" smtClean="0"/>
+              <a:t>it</a:t>
             </a:r>
           </a:p>
           <a:p>
             <a:pPr lvl="2"/>
             <a:r>
               <a:rPr lang="en-US" dirty="0" smtClean="0"/>
-              <a:t>Package </a:t>
+              <a:t>Add bundle </a:t>
             </a:r>
             <a:r>
               <a:rPr lang="en-US" i="1" dirty="0" err="1" smtClean="0"/>
               <a:t>org.eclipse.osgi</a:t>
             </a:r>
-            <a:r>
-              <a:rPr lang="en-US" dirty="0" smtClean="0"/>
-              <a:t> is required to be selected</a:t>
-            </a:r>
+            <a:endParaRPr lang="en-US" i="1" dirty="0" smtClean="0"/>
           </a:p>
           <a:p>
             <a:pPr lvl="2"/>
             <a:r>
               <a:rPr lang="en-US" dirty="0" smtClean="0"/>
-              <a:t>Use “Add required bundles”</a:t>
-            </a:r>
+              <a:t>Add bundles needed for </a:t>
+            </a:r>
+            <a:r>
+              <a:rPr lang="en-US" dirty="0" err="1" smtClean="0"/>
+              <a:t>OSGi</a:t>
+            </a:r>
+            <a:r>
+              <a:rPr lang="en-US" dirty="0" smtClean="0"/>
+              <a:t> console: </a:t>
+            </a:r>
+            <a:r>
+              <a:rPr lang="en-US" i="1" dirty="0" err="1" smtClean="0"/>
+              <a:t>org.apache.felix.gogo.command</a:t>
+            </a:r>
+            <a:r>
+              <a:rPr lang="en-US" dirty="0" smtClean="0"/>
+              <a:t>, </a:t>
+            </a:r>
+            <a:r>
+              <a:rPr lang="en-US" i="1" dirty="0" err="1" smtClean="0"/>
+              <a:t>org.apache.felix.gogo.runtime</a:t>
+            </a:r>
+            <a:r>
+              <a:rPr lang="en-US" i="1" dirty="0" smtClean="0"/>
+              <a:t>, </a:t>
+            </a:r>
+            <a:r>
+              <a:rPr lang="en-US" i="1" dirty="0" err="1" smtClean="0"/>
+              <a:t>org.apache.felix.gogo.shell</a:t>
+            </a:r>
+            <a:r>
+              <a:rPr lang="en-US" dirty="0" smtClean="0"/>
+              <a:t> and </a:t>
+            </a:r>
+            <a:r>
+              <a:rPr lang="en-US" i="1" dirty="0" err="1" smtClean="0"/>
+              <a:t>org.eclipse.equinox.console</a:t>
+            </a:r>
+            <a:endParaRPr lang="en-US" i="1" dirty="0" smtClean="0"/>
           </a:p>
           <a:p>
             <a:pPr lvl="1"/>
+            <a:r>
+              <a:rPr lang="en-US" dirty="0" smtClean="0"/>
+              <a:t>Check that all dependencies are satisfied using “</a:t>
+            </a:r>
+            <a:r>
+              <a:rPr lang="en-US" i="1" dirty="0" smtClean="0"/>
+              <a:t>Validate Bundles</a:t>
+            </a:r>
+            <a:r>
+              <a:rPr lang="en-US" dirty="0" smtClean="0"/>
+              <a:t>” button</a:t>
+            </a:r>
+          </a:p>
+          <a:p>
+            <a:pPr lvl="1"/>
+            <a:r>
+              <a:rPr lang="en-US" dirty="0" smtClean="0"/>
+              <a:t>In “</a:t>
+            </a:r>
+            <a:r>
+              <a:rPr lang="en-US" i="1" dirty="0"/>
+              <a:t>Arguments &gt; VM arguments” delete “-</a:t>
+            </a:r>
+            <a:r>
+              <a:rPr lang="en-US" i="1" dirty="0" err="1" smtClean="0"/>
+              <a:t>XX:MaxPermSize</a:t>
+            </a:r>
+            <a:r>
+              <a:rPr lang="en-US" i="1" dirty="0" smtClean="0"/>
+              <a:t>=256m” if you are using JRE 1.8</a:t>
+            </a:r>
+          </a:p>
+          <a:p>
+            <a:pPr lvl="1"/>
+            <a:r>
+              <a:rPr lang="en-US" dirty="0" smtClean="0"/>
+              <a:t>Observe </a:t>
+            </a:r>
+            <a:r>
+              <a:rPr lang="en-US" dirty="0" smtClean="0"/>
+              <a:t>its state in the </a:t>
+            </a:r>
+            <a:r>
+              <a:rPr lang="en-US" dirty="0" smtClean="0"/>
+              <a:t>console</a:t>
+            </a:r>
             <a:endParaRPr lang="en-US" dirty="0" smtClean="0"/>
-          </a:p>
-          <a:p>
-            <a:r>
-              <a:rPr lang="en-US" dirty="0" smtClean="0"/>
-              <a:t>Observe its state in the console</a:t>
-            </a:r>
-          </a:p>
-          <a:p>
-            <a:endParaRPr lang="en-US" dirty="0"/>
           </a:p>
         </p:txBody>
       </p:sp>
@@ -7984,7 +8333,7 @@
             </a:pPr>
             <a:r>
               <a:rPr lang="en-US" b="1" smtClean="0"/>
-              <a:t>Michal Malohlava &amp; Pavel Parízek, NPRG044, OSGi framework</a:t>
+              <a:t>Michal Malohlava &amp; Pavel Parízek &amp; Jiří Vinárek, NPRG044, OSGi framework</a:t>
             </a:r>
             <a:endParaRPr lang="cs-CZ" i="1" dirty="0"/>
           </a:p>
@@ -8214,7 +8563,7 @@
             </a:pPr>
             <a:r>
               <a:rPr lang="en-US" b="1" smtClean="0"/>
-              <a:t>Michal Malohlava &amp; Pavel Parízek, NPRG044, OSGi framework</a:t>
+              <a:t>Michal Malohlava &amp; Pavel Parízek &amp; Jiří Vinárek, NPRG044, OSGi framework</a:t>
             </a:r>
             <a:endParaRPr lang="cs-CZ" i="1" dirty="0"/>
           </a:p>
@@ -9068,7 +9417,7 @@
             </a:pPr>
             <a:r>
               <a:rPr lang="en-US" b="1" smtClean="0"/>
-              <a:t>Michal Malohlava &amp; Pavel Parízek, NPRG044, OSGi framework</a:t>
+              <a:t>Michal Malohlava &amp; Pavel Parízek &amp; Jiří Vinárek, NPRG044, OSGi framework</a:t>
             </a:r>
             <a:endParaRPr lang="cs-CZ" i="1" dirty="0"/>
           </a:p>
@@ -9805,7 +10154,7 @@
             </a:pPr>
             <a:r>
               <a:rPr lang="en-US" b="1" smtClean="0"/>
-              <a:t>Michal Malohlava &amp; Pavel Parízek, NPRG044, OSGi framework</a:t>
+              <a:t>Michal Malohlava &amp; Pavel Parízek &amp; Jiří Vinárek, NPRG044, OSGi framework</a:t>
             </a:r>
             <a:endParaRPr lang="cs-CZ" i="1" dirty="0"/>
           </a:p>
@@ -9899,9 +10248,10 @@
           </a:p>
           <a:p>
             <a:r>
-              <a:rPr lang="en-US" i="1" dirty="0" smtClean="0"/>
-              <a:t>MANIFEST.FM </a:t>
-            </a:r>
+              <a:rPr lang="en-US" i="1" smtClean="0"/>
+              <a:t>MANIFEST.MF </a:t>
+            </a:r>
+            <a:endParaRPr lang="en-US" i="1" dirty="0" smtClean="0"/>
           </a:p>
           <a:p>
             <a:pPr lvl="1"/>
@@ -11215,7 +11565,7 @@
             </a:pPr>
             <a:r>
               <a:rPr lang="en-US" b="1" smtClean="0"/>
-              <a:t>Michal Malohlava &amp; Pavel Parízek, NPRG044, OSGi framework</a:t>
+              <a:t>Michal Malohlava &amp; Pavel Parízek &amp; Jiří Vinárek, NPRG044, OSGi framework</a:t>
             </a:r>
             <a:endParaRPr lang="cs-CZ" i="1" dirty="0"/>
           </a:p>
@@ -11422,7 +11772,7 @@
             </a:pPr>
             <a:r>
               <a:rPr lang="en-US" b="1" smtClean="0"/>
-              <a:t>Michal Malohlava &amp; Pavel Parízek, NPRG044, OSGi framework</a:t>
+              <a:t>Michal Malohlava &amp; Pavel Parízek &amp; Jiří Vinárek, NPRG044, OSGi framework</a:t>
             </a:r>
             <a:endParaRPr lang="cs-CZ" i="1" dirty="0"/>
           </a:p>
@@ -11628,7 +11978,7 @@
             </a:pPr>
             <a:r>
               <a:rPr lang="en-US" b="1" smtClean="0"/>
-              <a:t>Michal Malohlava &amp; Pavel Parízek, NPRG044, OSGi framework</a:t>
+              <a:t>Michal Malohlava &amp; Pavel Parízek &amp; Jiří Vinárek, NPRG044, OSGi framework</a:t>
             </a:r>
             <a:endParaRPr lang="cs-CZ" i="1" dirty="0"/>
           </a:p>
@@ -12404,7 +12754,7 @@
             </a:pPr>
             <a:r>
               <a:rPr lang="en-US" b="1" smtClean="0"/>
-              <a:t>Michal Malohlava &amp; Pavel Parízek, NPRG044, OSGi framework</a:t>
+              <a:t>Michal Malohlava &amp; Pavel Parízek &amp; Jiří Vinárek, NPRG044, OSGi framework</a:t>
             </a:r>
             <a:endParaRPr lang="cs-CZ" i="1" dirty="0"/>
           </a:p>
@@ -12699,7 +13049,7 @@
             </a:pPr>
             <a:r>
               <a:rPr lang="en-US" b="1" smtClean="0"/>
-              <a:t>Michal Malohlava &amp; Pavel Parízek, NPRG044, OSGi framework</a:t>
+              <a:t>Michal Malohlava &amp; Pavel Parízek &amp; Jiří Vinárek, NPRG044, OSGi framework</a:t>
             </a:r>
             <a:endParaRPr lang="cs-CZ" i="1" dirty="0"/>
           </a:p>
@@ -13426,7 +13776,7 @@
             </a:pPr>
             <a:r>
               <a:rPr lang="en-US" b="1" smtClean="0"/>
-              <a:t>Michal Malohlava &amp; Pavel Parízek, NPRG044, OSGi framework</a:t>
+              <a:t>Michal Malohlava &amp; Pavel Parízek &amp; Jiří Vinárek, NPRG044, OSGi framework</a:t>
             </a:r>
             <a:endParaRPr lang="cs-CZ" i="1" dirty="0"/>
           </a:p>
@@ -13759,7 +14109,7 @@
             </a:pPr>
             <a:r>
               <a:rPr lang="en-US" b="1" smtClean="0"/>
-              <a:t>Michal Malohlava &amp; Pavel Parízek, NPRG044, OSGi framework</a:t>
+              <a:t>Michal Malohlava &amp; Pavel Parízek &amp; Jiří Vinárek, NPRG044, OSGi framework</a:t>
             </a:r>
             <a:endParaRPr lang="cs-CZ" i="1" dirty="0"/>
           </a:p>
@@ -14535,7 +14885,7 @@
             </a:pPr>
             <a:r>
               <a:rPr lang="en-US" b="1" smtClean="0"/>
-              <a:t>Michal Malohlava &amp; Pavel Parízek, NPRG044, OSGi framework</a:t>
+              <a:t>Michal Malohlava &amp; Pavel Parízek &amp; Jiří Vinárek, NPRG044, OSGi framework</a:t>
             </a:r>
             <a:endParaRPr lang="cs-CZ" i="1" dirty="0"/>
           </a:p>
@@ -14971,7 +15321,7 @@
             </a:pPr>
             <a:r>
               <a:rPr lang="en-US" b="1" smtClean="0"/>
-              <a:t>Michal Malohlava &amp; Pavel Parízek, NPRG044, OSGi framework</a:t>
+              <a:t>Michal Malohlava &amp; Pavel Parízek &amp; Jiří Vinárek, NPRG044, OSGi framework</a:t>
             </a:r>
             <a:endParaRPr lang="cs-CZ" i="1" dirty="0"/>
           </a:p>
@@ -15189,7 +15539,7 @@
             </a:pPr>
             <a:r>
               <a:rPr lang="en-US" b="1" smtClean="0"/>
-              <a:t>Michal Malohlava &amp; Pavel Parízek, NPRG044, OSGi framework</a:t>
+              <a:t>Michal Malohlava &amp; Pavel Parízek &amp; Jiří Vinárek, NPRG044, OSGi framework</a:t>
             </a:r>
             <a:endParaRPr lang="cs-CZ" i="1" dirty="0"/>
           </a:p>
@@ -15430,7 +15780,7 @@
             </a:pPr>
             <a:r>
               <a:rPr lang="en-US" b="1" smtClean="0"/>
-              <a:t>Michal Malohlava &amp; Pavel Parízek, NPRG044, OSGi framework</a:t>
+              <a:t>Michal Malohlava &amp; Pavel Parízek &amp; Jiří Vinárek, NPRG044, OSGi framework</a:t>
             </a:r>
             <a:endParaRPr lang="cs-CZ" i="1" dirty="0"/>
           </a:p>
@@ -15691,7 +16041,7 @@
             </a:pPr>
             <a:r>
               <a:rPr lang="en-US" b="1" smtClean="0"/>
-              <a:t>Michal Malohlava &amp; Pavel Parízek, NPRG044, OSGi framework</a:t>
+              <a:t>Michal Malohlava &amp; Pavel Parízek &amp; Jiří Vinárek, NPRG044, OSGi framework</a:t>
             </a:r>
             <a:endParaRPr lang="cs-CZ" i="1" dirty="0"/>
           </a:p>
@@ -15879,7 +16229,7 @@
             </a:pPr>
             <a:r>
               <a:rPr lang="en-US" b="1" smtClean="0"/>
-              <a:t>Michal Malohlava &amp; Pavel Parízek, NPRG044, OSGi framework</a:t>
+              <a:t>Michal Malohlava &amp; Pavel Parízek &amp; Jiří Vinárek, NPRG044, OSGi framework</a:t>
             </a:r>
             <a:endParaRPr lang="cs-CZ" i="1" dirty="0"/>
           </a:p>
@@ -16064,15 +16414,7 @@
             </a:pPr>
             <a:r>
               <a:rPr lang="en-US" b="1" smtClean="0"/>
-              <a:t>Michal Malohlava &amp; Pavel </a:t>
-            </a:r>
-            <a:r>
-              <a:rPr lang="cs-CZ" b="1" smtClean="0"/>
-              <a:t>Parízek</a:t>
-            </a:r>
-            <a:r>
-              <a:rPr lang="en-US" b="1" smtClean="0"/>
-              <a:t>, NPRG044, OSGi framework</a:t>
+              <a:t>Michal Malohlava &amp; Pavel Parízek &amp; Jiří Vinárek, NPRG044, OSGi framework</a:t>
             </a:r>
             <a:endParaRPr lang="cs-CZ" i="1" dirty="0"/>
           </a:p>
@@ -16218,7 +16560,7 @@
             </a:pPr>
             <a:r>
               <a:rPr lang="en-US" b="1" smtClean="0"/>
-              <a:t>Michal Malohlava &amp; Pavel Parízek, NPRG044, OSGi framework</a:t>
+              <a:t>Michal Malohlava &amp; Pavel Parízek &amp; Jiří Vinárek, NPRG044, OSGi framework</a:t>
             </a:r>
             <a:endParaRPr lang="cs-CZ" i="1" dirty="0"/>
           </a:p>
@@ -16884,7 +17226,7 @@
             </a:pPr>
             <a:r>
               <a:rPr lang="en-US" b="1" smtClean="0"/>
-              <a:t>Michal Malohlava &amp; Pavel Parízek, NPRG044, OSGi framework</a:t>
+              <a:t>Michal Malohlava &amp; Pavel Parízek &amp; Jiří Vinárek, NPRG044, OSGi framework</a:t>
             </a:r>
             <a:endParaRPr lang="cs-CZ" i="1" dirty="0"/>
           </a:p>
@@ -17155,7 +17497,7 @@
             </a:pPr>
             <a:r>
               <a:rPr lang="en-US" b="1" smtClean="0"/>
-              <a:t>Michal Malohlava &amp; Pavel Parízek, NPRG044, OSGi framework</a:t>
+              <a:t>Michal Malohlava &amp; Pavel Parízek &amp; Jiří Vinárek, NPRG044, OSGi framework</a:t>
             </a:r>
             <a:endParaRPr lang="cs-CZ" i="1" dirty="0"/>
           </a:p>
@@ -17416,7 +17758,7 @@
             </a:pPr>
             <a:r>
               <a:rPr lang="en-US" b="1" smtClean="0"/>
-              <a:t>Michal Malohlava &amp; Pavel Parízek, NPRG044, OSGi framework</a:t>
+              <a:t>Michal Malohlava &amp; Pavel Parízek &amp; Jiří Vinárek, NPRG044, OSGi framework</a:t>
             </a:r>
             <a:endParaRPr lang="cs-CZ" i="1" dirty="0"/>
           </a:p>
@@ -17635,7 +17977,7 @@
             </a:pPr>
             <a:r>
               <a:rPr lang="en-US" b="1" smtClean="0"/>
-              <a:t>Michal Malohlava &amp; Pavel Parízek, NPRG044, OSGi framework</a:t>
+              <a:t>Michal Malohlava &amp; Pavel Parízek &amp; Jiří Vinárek, NPRG044, OSGi framework</a:t>
             </a:r>
             <a:endParaRPr lang="cs-CZ" i="1" dirty="0"/>
           </a:p>
@@ -17693,7 +18035,7 @@
             <a:pPr lvl="1"/>
             <a:r>
               <a:rPr lang="en-US" dirty="0" smtClean="0">
-                <a:hlinkClick r:id="rId2"/>
+                <a:hlinkClick r:id="rId3"/>
               </a:rPr>
               <a:t>http://www.osgi.org/</a:t>
             </a:r>
@@ -17713,7 +18055,7 @@
             <a:pPr lvl="1"/>
             <a:r>
               <a:rPr lang="en-US" dirty="0" smtClean="0">
-                <a:hlinkClick r:id="rId3"/>
+                <a:hlinkClick r:id="rId4"/>
               </a:rPr>
               <a:t>http://en.wikipedia.org/wiki/OSGi</a:t>
             </a:r>
@@ -17733,9 +18075,9 @@
             <a:pPr lvl="1"/>
             <a:r>
               <a:rPr lang="en-US" dirty="0" smtClean="0">
-                <a:hlinkClick r:id="rId4"/>
-              </a:rPr>
-              <a:t>http://code.google.com/a/eclipselabs.org/p/nprg044-eclipse-platform/</a:t>
+                <a:hlinkClick r:id="rId5"/>
+              </a:rPr>
+              <a:t>https://github.com/d3slect/nprg044-eclipse-platform</a:t>
             </a:r>
             <a:endParaRPr lang="en-US" dirty="0" smtClean="0"/>
           </a:p>
@@ -17835,7 +18177,7 @@
             </a:pPr>
             <a:r>
               <a:rPr lang="en-US" b="1" smtClean="0"/>
-              <a:t>Michal Malohlava &amp; Pavel Parízek, NPRG044, OSGi framework</a:t>
+              <a:t>Michal Malohlava &amp; Pavel Parízek &amp; Jiří Vinárek, NPRG044, OSGi framework</a:t>
             </a:r>
             <a:endParaRPr lang="cs-CZ" i="1" dirty="0"/>
           </a:p>
@@ -18157,7 +18499,7 @@
             </a:pPr>
             <a:r>
               <a:rPr lang="en-US" b="1" smtClean="0"/>
-              <a:t>Michal Malohlava &amp; Pavel Parízek, NPRG044, OSGi framework</a:t>
+              <a:t>Michal Malohlava &amp; Pavel Parízek &amp; Jiří Vinárek, NPRG044, OSGi framework</a:t>
             </a:r>
             <a:endParaRPr lang="cs-CZ" i="1" dirty="0"/>
           </a:p>
@@ -18518,7 +18860,7 @@
             </a:pPr>
             <a:r>
               <a:rPr lang="en-US" b="1" smtClean="0"/>
-              <a:t>Michal Malohlava &amp; Pavel Parízek, NPRG044, OSGi framework</a:t>
+              <a:t>Michal Malohlava &amp; Pavel Parízek &amp; Jiří Vinárek, NPRG044, OSGi framework</a:t>
             </a:r>
             <a:endParaRPr lang="cs-CZ" i="1" dirty="0"/>
           </a:p>
@@ -18566,7 +18908,7 @@
         </p:spPr>
         <p:txBody>
           <a:bodyPr>
-            <a:normAutofit fontScale="85000" lnSpcReduction="20000"/>
+            <a:normAutofit fontScale="77500" lnSpcReduction="20000"/>
           </a:bodyPr>
           <a:lstStyle/>
           <a:p>
@@ -18583,14 +18925,22 @@
             <a:pPr lvl="1"/>
             <a:r>
               <a:rPr lang="en-US" dirty="0" smtClean="0"/>
-              <a:t>Open Service Gateway Initiative</a:t>
+              <a:t>Open Service Gateway </a:t>
+            </a:r>
+            <a:r>
+              <a:rPr lang="en-US" dirty="0"/>
+              <a:t>i</a:t>
+            </a:r>
+            <a:r>
+              <a:rPr lang="en-US" dirty="0" smtClean="0"/>
+              <a:t>nitiative</a:t>
             </a:r>
           </a:p>
           <a:p>
             <a:pPr lvl="1"/>
             <a:r>
               <a:rPr lang="en-US" dirty="0" smtClean="0"/>
-              <a:t>Current version R5 (see </a:t>
+              <a:t>Current version R6 (see </a:t>
             </a:r>
             <a:r>
               <a:rPr lang="en-US" dirty="0">
@@ -18613,7 +18963,7 @@
             <a:pPr lvl="1"/>
             <a:r>
               <a:rPr lang="en-US" dirty="0" smtClean="0"/>
-              <a:t>Three parts + Java API + execution environment specification</a:t>
+              <a:t>Five parts + Java API + execution environment specification</a:t>
             </a:r>
           </a:p>
           <a:p>
@@ -18638,6 +18988,23 @@
             </a:r>
           </a:p>
           <a:p>
+            <a:pPr lvl="2"/>
+            <a:r>
+              <a:rPr lang="en-US" dirty="0" smtClean="0"/>
+              <a:t>Residential</a:t>
+            </a:r>
+          </a:p>
+          <a:p>
+            <a:pPr lvl="2"/>
+            <a:r>
+              <a:rPr lang="en-US" dirty="0" smtClean="0"/>
+              <a:t>Mobile</a:t>
+            </a:r>
+          </a:p>
+          <a:p>
+            <a:pPr marL="914400" lvl="2" indent="0">
+              <a:buNone/>
+            </a:pPr>
             <a:endParaRPr lang="en-US" dirty="0" smtClean="0"/>
           </a:p>
           <a:p>
@@ -18759,7 +19126,7 @@
             </a:pPr>
             <a:r>
               <a:rPr lang="en-US" b="1" smtClean="0"/>
-              <a:t>Michal Malohlava &amp; Pavel Parízek, NPRG044, OSGi framework</a:t>
+              <a:t>Michal Malohlava &amp; Pavel Parízek &amp; Jiří Vinárek, NPRG044, OSGi framework</a:t>
             </a:r>
             <a:endParaRPr lang="cs-CZ" i="1" dirty="0"/>
           </a:p>
@@ -19035,7 +19402,7 @@
             </a:pPr>
             <a:r>
               <a:rPr lang="en-US" b="1" smtClean="0"/>
-              <a:t>Michal Malohlava &amp; Pavel Parízek, NPRG044, OSGi framework</a:t>
+              <a:t>Michal Malohlava &amp; Pavel Parízek &amp; Jiří Vinárek, NPRG044, OSGi framework</a:t>
             </a:r>
             <a:endParaRPr lang="cs-CZ" i="1" dirty="0"/>
           </a:p>

</xml_diff>